<commit_message>
Final Slides and Jupyter Notebook
</commit_message>
<xml_diff>
--- a/Resources/Clay's PowerPoint.pptx
+++ b/Resources/Clay's PowerPoint.pptx
@@ -5,31 +5,32 @@
     <p:sldMasterId id="2147483659" r:id="rId1"/>
   </p:sldMasterIdLst>
   <p:notesMasterIdLst>
-    <p:notesMasterId r:id="rId9"/>
+    <p:notesMasterId r:id="rId10"/>
   </p:notesMasterIdLst>
   <p:sldIdLst>
     <p:sldId id="297" r:id="rId2"/>
     <p:sldId id="298" r:id="rId3"/>
     <p:sldId id="299" r:id="rId4"/>
     <p:sldId id="296" r:id="rId5"/>
-    <p:sldId id="258" r:id="rId6"/>
-    <p:sldId id="301" r:id="rId7"/>
-    <p:sldId id="295" r:id="rId8"/>
+    <p:sldId id="302" r:id="rId6"/>
+    <p:sldId id="258" r:id="rId7"/>
+    <p:sldId id="301" r:id="rId8"/>
+    <p:sldId id="295" r:id="rId9"/>
   </p:sldIdLst>
   <p:sldSz cx="9144000" cy="5143500" type="screen16x9"/>
   <p:notesSz cx="6858000" cy="9144000"/>
   <p:embeddedFontLst>
     <p:embeddedFont>
       <p:font typeface="Oswald" panose="020B0604020202020204" charset="0"/>
-      <p:regular r:id="rId10"/>
-      <p:bold r:id="rId11"/>
+      <p:regular r:id="rId11"/>
+      <p:bold r:id="rId12"/>
     </p:embeddedFont>
     <p:embeddedFont>
       <p:font typeface="Source Sans Pro" panose="020B0503030403020204" pitchFamily="34" charset="0"/>
-      <p:regular r:id="rId12"/>
-      <p:bold r:id="rId13"/>
-      <p:italic r:id="rId14"/>
-      <p:boldItalic r:id="rId15"/>
+      <p:regular r:id="rId13"/>
+      <p:bold r:id="rId14"/>
+      <p:italic r:id="rId15"/>
+      <p:boldItalic r:id="rId16"/>
     </p:embeddedFont>
   </p:embeddedFontLst>
   <p:defaultTextStyle>
@@ -272,7 +273,7 @@
 <file path=ppt/revisionInfo.xml><?xml version="1.0" encoding="utf-8"?>
 <p1510:revInfo xmlns:a="http://schemas.openxmlformats.org/drawingml/2006/main" xmlns:r="http://schemas.openxmlformats.org/officeDocument/2006/relationships" xmlns:p1510="http://schemas.microsoft.com/office/powerpoint/2015/10/main">
   <p1510:revLst>
-    <p1510:client id="{13D32A9F-2840-4BBE-A4B4-BC34F2BC75C8}" v="40" dt="2021-04-30T23:52:23.042"/>
+    <p1510:client id="{13D32A9F-2840-4BBE-A4B4-BC34F2BC75C8}" v="42" dt="2021-05-01T01:33:15.369"/>
   </p1510:revLst>
 </p1510:revInfo>
 </file>
@@ -282,7 +283,7 @@
   <pc:docChgLst>
     <pc:chgData name="Clay" userId="eaff20e7a8559304" providerId="LiveId" clId="{13D32A9F-2840-4BBE-A4B4-BC34F2BC75C8}"/>
     <pc:docChg chg="undo custSel addSld delSld modSld sldOrd">
-      <pc:chgData name="Clay" userId="eaff20e7a8559304" providerId="LiveId" clId="{13D32A9F-2840-4BBE-A4B4-BC34F2BC75C8}" dt="2021-04-30T23:57:41.209" v="1961" actId="1076"/>
+      <pc:chgData name="Clay" userId="eaff20e7a8559304" providerId="LiveId" clId="{13D32A9F-2840-4BBE-A4B4-BC34F2BC75C8}" dt="2021-05-01T01:38:01.349" v="2062" actId="1076"/>
       <pc:docMkLst>
         <pc:docMk/>
       </pc:docMkLst>
@@ -349,11 +350,19 @@
         </pc:picChg>
       </pc:sldChg>
       <pc:sldChg chg="addSp delSp modSp mod">
-        <pc:chgData name="Clay" userId="eaff20e7a8559304" providerId="LiveId" clId="{13D32A9F-2840-4BBE-A4B4-BC34F2BC75C8}" dt="2021-04-30T23:57:41.209" v="1961" actId="1076"/>
+        <pc:chgData name="Clay" userId="eaff20e7a8559304" providerId="LiveId" clId="{13D32A9F-2840-4BBE-A4B4-BC34F2BC75C8}" dt="2021-05-01T01:38:01.349" v="2062" actId="1076"/>
         <pc:sldMkLst>
           <pc:docMk/>
           <pc:sldMk cId="0" sldId="258"/>
         </pc:sldMkLst>
+        <pc:spChg chg="add mod">
+          <ac:chgData name="Clay" userId="eaff20e7a8559304" providerId="LiveId" clId="{13D32A9F-2840-4BBE-A4B4-BC34F2BC75C8}" dt="2021-05-01T01:32:50.549" v="2036" actId="207"/>
+          <ac:spMkLst>
+            <pc:docMk/>
+            <pc:sldMk cId="0" sldId="258"/>
+            <ac:spMk id="2" creationId="{6ED25C7F-A771-470A-BAEB-CCB9D6D66BDA}"/>
+          </ac:spMkLst>
+        </pc:spChg>
         <pc:spChg chg="add del mod">
           <ac:chgData name="Clay" userId="eaff20e7a8559304" providerId="LiveId" clId="{13D32A9F-2840-4BBE-A4B4-BC34F2BC75C8}" dt="2021-04-30T20:18:10.984" v="1380"/>
           <ac:spMkLst>
@@ -403,7 +412,15 @@
           </ac:picMkLst>
         </pc:picChg>
         <pc:picChg chg="add mod">
-          <ac:chgData name="Clay" userId="eaff20e7a8559304" providerId="LiveId" clId="{13D32A9F-2840-4BBE-A4B4-BC34F2BC75C8}" dt="2021-04-30T23:46:44.908" v="1566" actId="1035"/>
+          <ac:chgData name="Clay" userId="eaff20e7a8559304" providerId="LiveId" clId="{13D32A9F-2840-4BBE-A4B4-BC34F2BC75C8}" dt="2021-05-01T01:38:01.349" v="2062" actId="1076"/>
+          <ac:picMkLst>
+            <pc:docMk/>
+            <pc:sldMk cId="0" sldId="258"/>
+            <ac:picMk id="4" creationId="{A037F62C-12CB-494B-BE70-9C3952016EF9}"/>
+          </ac:picMkLst>
+        </pc:picChg>
+        <pc:picChg chg="add del mod">
+          <ac:chgData name="Clay" userId="eaff20e7a8559304" providerId="LiveId" clId="{13D32A9F-2840-4BBE-A4B4-BC34F2BC75C8}" dt="2021-05-01T01:37:03.183" v="2052" actId="478"/>
           <ac:picMkLst>
             <pc:docMk/>
             <pc:sldMk cId="0" sldId="258"/>
@@ -704,11 +721,19 @@
         </pc:sldMkLst>
       </pc:sldChg>
       <pc:sldChg chg="addSp delSp modSp new mod">
-        <pc:chgData name="Clay" userId="eaff20e7a8559304" providerId="LiveId" clId="{13D32A9F-2840-4BBE-A4B4-BC34F2BC75C8}" dt="2021-04-30T20:20:51.493" v="1383" actId="14100"/>
+        <pc:chgData name="Clay" userId="eaff20e7a8559304" providerId="LiveId" clId="{13D32A9F-2840-4BBE-A4B4-BC34F2BC75C8}" dt="2021-05-01T01:37:53.896" v="2061" actId="1076"/>
         <pc:sldMkLst>
           <pc:docMk/>
           <pc:sldMk cId="3329890763" sldId="295"/>
         </pc:sldMkLst>
+        <pc:spChg chg="add mod">
+          <ac:chgData name="Clay" userId="eaff20e7a8559304" providerId="LiveId" clId="{13D32A9F-2840-4BBE-A4B4-BC34F2BC75C8}" dt="2021-05-01T01:33:22.410" v="2046" actId="20577"/>
+          <ac:spMkLst>
+            <pc:docMk/>
+            <pc:sldMk cId="3329890763" sldId="295"/>
+            <ac:spMk id="3" creationId="{559DF2E8-7AF0-474B-8417-3D328CCB385A}"/>
+          </ac:spMkLst>
+        </pc:spChg>
         <pc:spChg chg="add mod">
           <ac:chgData name="Clay" userId="eaff20e7a8559304" providerId="LiveId" clId="{13D32A9F-2840-4BBE-A4B4-BC34F2BC75C8}" dt="2021-04-30T19:37:45.784" v="1285" actId="1076"/>
           <ac:spMkLst>
@@ -725,12 +750,20 @@
             <ac:picMk id="4" creationId="{32B16B76-E35A-4166-B198-45306009581D}"/>
           </ac:picMkLst>
         </pc:picChg>
-        <pc:picChg chg="add mod">
-          <ac:chgData name="Clay" userId="eaff20e7a8559304" providerId="LiveId" clId="{13D32A9F-2840-4BBE-A4B4-BC34F2BC75C8}" dt="2021-04-30T20:20:51.493" v="1383" actId="14100"/>
+        <pc:picChg chg="add del mod">
+          <ac:chgData name="Clay" userId="eaff20e7a8559304" providerId="LiveId" clId="{13D32A9F-2840-4BBE-A4B4-BC34F2BC75C8}" dt="2021-05-01T01:36:22.462" v="2047" actId="478"/>
           <ac:picMkLst>
             <pc:docMk/>
             <pc:sldMk cId="3329890763" sldId="295"/>
             <ac:picMk id="5" creationId="{B18CE133-3C0B-42F3-9275-CAC03CF2A6A6}"/>
+          </ac:picMkLst>
+        </pc:picChg>
+        <pc:picChg chg="add mod">
+          <ac:chgData name="Clay" userId="eaff20e7a8559304" providerId="LiveId" clId="{13D32A9F-2840-4BBE-A4B4-BC34F2BC75C8}" dt="2021-05-01T01:37:53.896" v="2061" actId="1076"/>
+          <ac:picMkLst>
+            <pc:docMk/>
+            <pc:sldMk cId="3329890763" sldId="295"/>
+            <ac:picMk id="7" creationId="{80EDB34E-57A4-4532-80FA-88EE855C70FB}"/>
           </ac:picMkLst>
         </pc:picChg>
       </pc:sldChg>
@@ -895,6 +928,45 @@
             <ac:spMk id="4" creationId="{52BEED55-29F9-43B3-8AF9-526FFC720620}"/>
           </ac:spMkLst>
         </pc:spChg>
+      </pc:sldChg>
+      <pc:sldChg chg="addSp delSp modSp new mod">
+        <pc:chgData name="Clay" userId="eaff20e7a8559304" providerId="LiveId" clId="{13D32A9F-2840-4BBE-A4B4-BC34F2BC75C8}" dt="2021-05-01T01:37:38.326" v="2057" actId="1076"/>
+        <pc:sldMkLst>
+          <pc:docMk/>
+          <pc:sldMk cId="3667109335" sldId="302"/>
+        </pc:sldMkLst>
+        <pc:picChg chg="add del mod">
+          <ac:chgData name="Clay" userId="eaff20e7a8559304" providerId="LiveId" clId="{13D32A9F-2840-4BBE-A4B4-BC34F2BC75C8}" dt="2021-05-01T01:25:09.281" v="1965" actId="478"/>
+          <ac:picMkLst>
+            <pc:docMk/>
+            <pc:sldMk cId="3667109335" sldId="302"/>
+            <ac:picMk id="4" creationId="{CD3B3422-4AA9-4D14-9296-954AABE71112}"/>
+          </ac:picMkLst>
+        </pc:picChg>
+        <pc:picChg chg="add del mod">
+          <ac:chgData name="Clay" userId="eaff20e7a8559304" providerId="LiveId" clId="{13D32A9F-2840-4BBE-A4B4-BC34F2BC75C8}" dt="2021-05-01T01:26:17.772" v="1969" actId="478"/>
+          <ac:picMkLst>
+            <pc:docMk/>
+            <pc:sldMk cId="3667109335" sldId="302"/>
+            <ac:picMk id="6" creationId="{C0B006E5-5ADF-4882-B856-6B271E1E4A1A}"/>
+          </ac:picMkLst>
+        </pc:picChg>
+        <pc:picChg chg="add del mod">
+          <ac:chgData name="Clay" userId="eaff20e7a8559304" providerId="LiveId" clId="{13D32A9F-2840-4BBE-A4B4-BC34F2BC75C8}" dt="2021-05-01T01:26:55.316" v="1972" actId="478"/>
+          <ac:picMkLst>
+            <pc:docMk/>
+            <pc:sldMk cId="3667109335" sldId="302"/>
+            <ac:picMk id="8" creationId="{B09EA92C-8C1B-404F-B17A-4A9D0EBF8D52}"/>
+          </ac:picMkLst>
+        </pc:picChg>
+        <pc:picChg chg="add mod">
+          <ac:chgData name="Clay" userId="eaff20e7a8559304" providerId="LiveId" clId="{13D32A9F-2840-4BBE-A4B4-BC34F2BC75C8}" dt="2021-05-01T01:37:38.326" v="2057" actId="1076"/>
+          <ac:picMkLst>
+            <pc:docMk/>
+            <pc:sldMk cId="3667109335" sldId="302"/>
+            <ac:picMk id="10" creationId="{4A2A9E70-1A18-40EE-B5AC-3B043B6BFE84}"/>
+          </ac:picMkLst>
+        </pc:picChg>
       </pc:sldChg>
       <pc:sldMasterChg chg="delSldLayout">
         <pc:chgData name="Clay" userId="eaff20e7a8559304" providerId="LiveId" clId="{13D32A9F-2840-4BBE-A4B4-BC34F2BC75C8}" dt="2021-04-30T23:42:57.064" v="1384" actId="2696"/>
@@ -8337,6 +8409,104 @@
   <p:cSld>
     <p:spTree>
       <p:nvGrpSpPr>
+        <p:cNvPr id="1" name=""/>
+        <p:cNvGrpSpPr/>
+        <p:nvPr/>
+      </p:nvGrpSpPr>
+      <p:grpSpPr>
+        <a:xfrm>
+          <a:off x="0" y="0"/>
+          <a:ext cx="0" cy="0"/>
+          <a:chOff x="0" y="0"/>
+          <a:chExt cx="0" cy="0"/>
+        </a:xfrm>
+      </p:grpSpPr>
+      <p:sp>
+        <p:nvSpPr>
+          <p:cNvPr id="2" name="Slide Number Placeholder 1">
+            <a:extLst>
+              <a:ext uri="{FF2B5EF4-FFF2-40B4-BE49-F238E27FC236}">
+                <a16:creationId xmlns:a16="http://schemas.microsoft.com/office/drawing/2014/main" id="{76D1C58B-A71B-4869-99F5-E95B817F6C7B}"/>
+              </a:ext>
+            </a:extLst>
+          </p:cNvPr>
+          <p:cNvSpPr>
+            <a:spLocks noGrp="1"/>
+          </p:cNvSpPr>
+          <p:nvPr>
+            <p:ph type="sldNum" idx="12"/>
+          </p:nvPr>
+        </p:nvSpPr>
+        <p:spPr/>
+        <p:txBody>
+          <a:bodyPr/>
+          <a:lstStyle/>
+          <a:p>
+            <a:pPr marL="0" lvl="0" indent="0" algn="r" rtl="0">
+              <a:spcBef>
+                <a:spcPts val="0"/>
+              </a:spcBef>
+              <a:spcAft>
+                <a:spcPts val="0"/>
+              </a:spcAft>
+              <a:buNone/>
+            </a:pPr>
+            <a:fld id="{00000000-1234-1234-1234-123412341234}" type="slidenum">
+              <a:rPr lang="en" smtClean="0"/>
+              <a:t>5</a:t>
+            </a:fld>
+            <a:endParaRPr lang="en"/>
+          </a:p>
+        </p:txBody>
+      </p:sp>
+      <p:pic>
+        <p:nvPicPr>
+          <p:cNvPr id="10" name="Picture 9">
+            <a:extLst>
+              <a:ext uri="{FF2B5EF4-FFF2-40B4-BE49-F238E27FC236}">
+                <a16:creationId xmlns:a16="http://schemas.microsoft.com/office/drawing/2014/main" id="{4A2A9E70-1A18-40EE-B5AC-3B043B6BFE84}"/>
+              </a:ext>
+            </a:extLst>
+          </p:cNvPr>
+          <p:cNvPicPr>
+            <a:picLocks noChangeAspect="1"/>
+          </p:cNvPicPr>
+          <p:nvPr/>
+        </p:nvPicPr>
+        <p:blipFill>
+          <a:blip r:embed="rId2"/>
+          <a:stretch>
+            <a:fillRect/>
+          </a:stretch>
+        </p:blipFill>
+        <p:spPr>
+          <a:xfrm>
+            <a:off x="2193391" y="402779"/>
+            <a:ext cx="4757217" cy="3991926"/>
+          </a:xfrm>
+          <a:prstGeom prst="rect">
+            <a:avLst/>
+          </a:prstGeom>
+        </p:spPr>
+      </p:pic>
+    </p:spTree>
+    <p:extLst>
+      <p:ext uri="{BB962C8B-B14F-4D97-AF65-F5344CB8AC3E}">
+        <p14:creationId xmlns:p14="http://schemas.microsoft.com/office/powerpoint/2010/main" val="3667109335"/>
+      </p:ext>
+    </p:extLst>
+  </p:cSld>
+  <p:clrMapOvr>
+    <a:masterClrMapping/>
+  </p:clrMapOvr>
+</p:sld>
+</file>
+
+<file path=ppt/slides/slide6.xml><?xml version="1.0" encoding="utf-8"?>
+<p:sld xmlns:a="http://schemas.openxmlformats.org/drawingml/2006/main" xmlns:r="http://schemas.openxmlformats.org/officeDocument/2006/relationships" xmlns:p="http://schemas.openxmlformats.org/presentationml/2006/main">
+  <p:cSld>
+    <p:spTree>
+      <p:nvGrpSpPr>
         <p:cNvPr id="1" name="Shape 477"/>
         <p:cNvGrpSpPr/>
         <p:nvPr/>
@@ -8385,42 +8555,12 @@
             </a:pPr>
             <a:fld id="{00000000-1234-1234-1234-123412341234}" type="slidenum">
               <a:rPr lang="en"/>
-              <a:t>5</a:t>
+              <a:t>6</a:t>
             </a:fld>
             <a:endParaRPr/>
           </a:p>
         </p:txBody>
       </p:sp>
-      <p:pic>
-        <p:nvPicPr>
-          <p:cNvPr id="6" name="Picture 5">
-            <a:extLst>
-              <a:ext uri="{FF2B5EF4-FFF2-40B4-BE49-F238E27FC236}">
-                <a16:creationId xmlns:a16="http://schemas.microsoft.com/office/drawing/2014/main" id="{0625D63F-D275-48DB-BFC9-E07E0984D130}"/>
-              </a:ext>
-            </a:extLst>
-          </p:cNvPr>
-          <p:cNvPicPr>
-            <a:picLocks noChangeAspect="1"/>
-          </p:cNvPicPr>
-          <p:nvPr/>
-        </p:nvPicPr>
-        <p:blipFill>
-          <a:blip r:embed="rId3"/>
-          <a:stretch>
-            <a:fillRect/>
-          </a:stretch>
-        </p:blipFill>
-        <p:spPr>
-          <a:xfrm>
-            <a:off x="1601610" y="209858"/>
-            <a:ext cx="5940779" cy="3776123"/>
-          </a:xfrm>
-          <a:prstGeom prst="rect">
-            <a:avLst/>
-          </a:prstGeom>
-        </p:spPr>
-      </p:pic>
       <p:sp>
         <p:nvSpPr>
           <p:cNvPr id="8" name="TextBox 7">
@@ -8476,6 +8616,77 @@
           </a:p>
         </p:txBody>
       </p:sp>
+      <p:sp>
+        <p:nvSpPr>
+          <p:cNvPr id="2" name="TextBox 1">
+            <a:extLst>
+              <a:ext uri="{FF2B5EF4-FFF2-40B4-BE49-F238E27FC236}">
+                <a16:creationId xmlns:a16="http://schemas.microsoft.com/office/drawing/2014/main" id="{6ED25C7F-A771-470A-BAEB-CCB9D6D66BDA}"/>
+              </a:ext>
+            </a:extLst>
+          </p:cNvPr>
+          <p:cNvSpPr txBox="1"/>
+          <p:nvPr/>
+        </p:nvSpPr>
+        <p:spPr>
+          <a:xfrm>
+            <a:off x="7276780" y="691563"/>
+            <a:ext cx="1828695" cy="523220"/>
+          </a:xfrm>
+          <a:prstGeom prst="rect">
+            <a:avLst/>
+          </a:prstGeom>
+          <a:noFill/>
+        </p:spPr>
+        <p:txBody>
+          <a:bodyPr wrap="square" rtlCol="0">
+            <a:spAutoFit/>
+          </a:bodyPr>
+          <a:lstStyle/>
+          <a:p>
+            <a:r>
+              <a:rPr lang="en-US" b="1" dirty="0">
+                <a:solidFill>
+                  <a:schemeClr val="accent1"/>
+                </a:solidFill>
+                <a:latin typeface="Source Sans Pro" panose="020B0503030403020204" pitchFamily="34" charset="0"/>
+                <a:ea typeface="Source Sans Pro" panose="020B0503030403020204" pitchFamily="34" charset="0"/>
+              </a:rPr>
+              <a:t>The r-squared value is: 0.000836.</a:t>
+            </a:r>
+          </a:p>
+        </p:txBody>
+      </p:sp>
+      <p:pic>
+        <p:nvPicPr>
+          <p:cNvPr id="4" name="Picture 3">
+            <a:extLst>
+              <a:ext uri="{FF2B5EF4-FFF2-40B4-BE49-F238E27FC236}">
+                <a16:creationId xmlns:a16="http://schemas.microsoft.com/office/drawing/2014/main" id="{A037F62C-12CB-494B-BE70-9C3952016EF9}"/>
+              </a:ext>
+            </a:extLst>
+          </p:cNvPr>
+          <p:cNvPicPr>
+            <a:picLocks noChangeAspect="1"/>
+          </p:cNvPicPr>
+          <p:nvPr/>
+        </p:nvPicPr>
+        <p:blipFill>
+          <a:blip r:embed="rId3"/>
+          <a:stretch>
+            <a:fillRect/>
+          </a:stretch>
+        </p:blipFill>
+        <p:spPr>
+          <a:xfrm>
+            <a:off x="1902549" y="286115"/>
+            <a:ext cx="5338901" cy="3540534"/>
+          </a:xfrm>
+          <a:prstGeom prst="rect">
+            <a:avLst/>
+          </a:prstGeom>
+        </p:spPr>
+      </p:pic>
     </p:spTree>
   </p:cSld>
   <p:clrMapOvr>
@@ -8484,7 +8695,7 @@
 </p:sld>
 </file>
 
-<file path=ppt/slides/slide6.xml><?xml version="1.0" encoding="utf-8"?>
+<file path=ppt/slides/slide7.xml><?xml version="1.0" encoding="utf-8"?>
 <p:sld xmlns:a="http://schemas.openxmlformats.org/drawingml/2006/main" xmlns:r="http://schemas.openxmlformats.org/officeDocument/2006/relationships" xmlns:p="http://schemas.openxmlformats.org/presentationml/2006/main">
   <p:cSld>
     <p:spTree>
@@ -8533,7 +8744,7 @@
             </a:pPr>
             <a:fld id="{00000000-1234-1234-1234-123412341234}" type="slidenum">
               <a:rPr lang="en" smtClean="0"/>
-              <a:t>6</a:t>
+              <a:t>7</a:t>
             </a:fld>
             <a:endParaRPr lang="en"/>
           </a:p>
@@ -8649,7 +8860,7 @@
 </p:sld>
 </file>
 
-<file path=ppt/slides/slide7.xml><?xml version="1.0" encoding="utf-8"?>
+<file path=ppt/slides/slide8.xml><?xml version="1.0" encoding="utf-8"?>
 <p:sld xmlns:a="http://schemas.openxmlformats.org/drawingml/2006/main" xmlns:r="http://schemas.openxmlformats.org/officeDocument/2006/relationships" xmlns:p="http://schemas.openxmlformats.org/presentationml/2006/main">
   <p:cSld>
     <p:spTree>
@@ -8698,7 +8909,7 @@
             </a:pPr>
             <a:fld id="{00000000-1234-1234-1234-123412341234}" type="slidenum">
               <a:rPr lang="en" smtClean="0"/>
-              <a:t>7</a:t>
+              <a:t>8</a:t>
             </a:fld>
             <a:endParaRPr lang="en"/>
           </a:p>
@@ -8746,12 +8957,56 @@
           </a:p>
         </p:txBody>
       </p:sp>
+      <p:sp>
+        <p:nvSpPr>
+          <p:cNvPr id="3" name="TextBox 2">
+            <a:extLst>
+              <a:ext uri="{FF2B5EF4-FFF2-40B4-BE49-F238E27FC236}">
+                <a16:creationId xmlns:a16="http://schemas.microsoft.com/office/drawing/2014/main" id="{559DF2E8-7AF0-474B-8417-3D328CCB385A}"/>
+              </a:ext>
+            </a:extLst>
+          </p:cNvPr>
+          <p:cNvSpPr txBox="1"/>
+          <p:nvPr/>
+        </p:nvSpPr>
+        <p:spPr>
+          <a:xfrm>
+            <a:off x="7222992" y="706931"/>
+            <a:ext cx="1605963" cy="738664"/>
+          </a:xfrm>
+          <a:prstGeom prst="rect">
+            <a:avLst/>
+          </a:prstGeom>
+          <a:noFill/>
+        </p:spPr>
+        <p:txBody>
+          <a:bodyPr wrap="square" rtlCol="0">
+            <a:spAutoFit/>
+          </a:bodyPr>
+          <a:lstStyle/>
+          <a:p>
+            <a:r>
+              <a:rPr lang="en-US" b="1" dirty="0">
+                <a:solidFill>
+                  <a:schemeClr val="accent1"/>
+                </a:solidFill>
+                <a:latin typeface="Source Sans Pro" panose="020B0503030403020204" pitchFamily="34" charset="0"/>
+                <a:ea typeface="Source Sans Pro" panose="020B0503030403020204" pitchFamily="34" charset="0"/>
+              </a:rPr>
+              <a:t>The r-squared value is: 0.00191.</a:t>
+            </a:r>
+          </a:p>
+          <a:p>
+            <a:endParaRPr lang="en-US" dirty="0"/>
+          </a:p>
+        </p:txBody>
+      </p:sp>
       <p:pic>
         <p:nvPicPr>
-          <p:cNvPr id="5" name="Picture 4">
+          <p:cNvPr id="7" name="Picture 6">
             <a:extLst>
               <a:ext uri="{FF2B5EF4-FFF2-40B4-BE49-F238E27FC236}">
-                <a16:creationId xmlns:a16="http://schemas.microsoft.com/office/drawing/2014/main" id="{B18CE133-3C0B-42F3-9275-CAC03CF2A6A6}"/>
+                <a16:creationId xmlns:a16="http://schemas.microsoft.com/office/drawing/2014/main" id="{80EDB34E-57A4-4532-80FA-88EE855C70FB}"/>
               </a:ext>
             </a:extLst>
           </p:cNvPr>
@@ -8768,8 +9023,8 @@
         </p:blipFill>
         <p:spPr>
           <a:xfrm>
-            <a:off x="1751960" y="160832"/>
-            <a:ext cx="5251219" cy="3626742"/>
+            <a:off x="1938516" y="333369"/>
+            <a:ext cx="5266966" cy="3484995"/>
           </a:xfrm>
           <a:prstGeom prst="rect">
             <a:avLst/>

</xml_diff>